<commit_message>
Updated intro slides with wlan password
</commit_message>
<xml_diff>
--- a/2017-10-24/intro/intro.pptx
+++ b/2017-10-24/intro/intro.pptx
@@ -7,8 +7,10 @@
   <p:sldIdLst>
     <p:sldId id="256" r:id="rId2"/>
     <p:sldId id="260" r:id="rId3"/>
-    <p:sldId id="261" r:id="rId4"/>
-    <p:sldId id="259" r:id="rId5"/>
+    <p:sldId id="259" r:id="rId4"/>
+    <p:sldId id="261" r:id="rId5"/>
+    <p:sldId id="262" r:id="rId6"/>
+    <p:sldId id="263" r:id="rId7"/>
   </p:sldIdLst>
   <p:sldSz cx="12192000" cy="6858000"/>
   <p:notesSz cx="6858000" cy="9144000"/>
@@ -3014,6 +3016,13 @@
   <p:clrMapOvr>
     <a:masterClrMapping/>
   </p:clrMapOvr>
+  <p:timing>
+    <p:tnLst>
+      <p:par>
+        <p:cTn id="1" dur="indefinite" restart="never" nodeType="tmRoot"/>
+      </p:par>
+    </p:tnLst>
+  </p:timing>
 </p:sld>
 </file>
 
@@ -3128,11 +3137,7 @@
             </a:r>
             <a:r>
               <a:rPr lang="en-US" dirty="0" smtClean="0"/>
-              <a:t> </a:t>
-            </a:r>
-            <a:r>
-              <a:rPr lang="en-US" dirty="0" smtClean="0"/>
-              <a:t>/ </a:t>
+              <a:t> / </a:t>
             </a:r>
             <a:r>
               <a:rPr lang="en-US" dirty="0" err="1" smtClean="0"/>
@@ -3148,11 +3153,7 @@
             </a:r>
             <a:r>
               <a:rPr lang="en-US" dirty="0" smtClean="0"/>
-              <a:t> </a:t>
-            </a:r>
-            <a:r>
-              <a:rPr lang="en-US" dirty="0" smtClean="0"/>
-              <a:t>von </a:t>
+              <a:t> von </a:t>
             </a:r>
             <a:r>
               <a:rPr lang="en-US" dirty="0" err="1" smtClean="0"/>
@@ -3269,7 +3270,6 @@
               <a:rPr lang="en-US" dirty="0" smtClean="0"/>
               <a:t> (MIT License)</a:t>
             </a:r>
-            <a:endParaRPr lang="en-US" dirty="0" smtClean="0"/>
           </a:p>
           <a:p>
             <a:r>
@@ -3290,11 +3290,7 @@
             </a:r>
             <a:r>
               <a:rPr lang="en-US" dirty="0" smtClean="0"/>
-              <a:t> Idea </a:t>
-            </a:r>
-            <a:r>
-              <a:rPr lang="en-US" dirty="0" smtClean="0"/>
-              <a:t>Lab / </a:t>
+              <a:t> Idea Lab / </a:t>
             </a:r>
             <a:r>
               <a:rPr lang="en-US" dirty="0" err="1" smtClean="0"/>
@@ -3341,6 +3337,13 @@
   <p:clrMapOvr>
     <a:masterClrMapping/>
   </p:clrMapOvr>
+  <p:timing>
+    <p:tnLst>
+      <p:par>
+        <p:cTn id="1" dur="indefinite" restart="never" nodeType="tmRoot"/>
+      </p:par>
+    </p:tnLst>
+  </p:timing>
 </p:sld>
 </file>
 
@@ -3377,47 +3380,200 @@
           <a:lstStyle/>
           <a:p>
             <a:r>
+              <a:rPr lang="en-US" dirty="0" smtClean="0"/>
+              <a:t>Agenda</a:t>
+            </a:r>
+            <a:endParaRPr lang="en-US" dirty="0"/>
+          </a:p>
+        </p:txBody>
+      </p:sp>
+      <p:sp>
+        <p:nvSpPr>
+          <p:cNvPr id="3" name="Content Placeholder 2"/>
+          <p:cNvSpPr>
+            <a:spLocks noGrp="1"/>
+          </p:cNvSpPr>
+          <p:nvPr>
+            <p:ph idx="1"/>
+          </p:nvPr>
+        </p:nvSpPr>
+        <p:spPr/>
+        <p:txBody>
+          <a:bodyPr/>
+          <a:lstStyle/>
+          <a:p>
+            <a:r>
+              <a:rPr lang="en-US" dirty="0" smtClean="0"/>
+              <a:t>Intro (Alex)</a:t>
+            </a:r>
+          </a:p>
+          <a:p>
+            <a:r>
               <a:rPr lang="en-US" dirty="0" err="1" smtClean="0"/>
-              <a:t>Nächster</a:t>
-            </a:r>
-            <a:r>
-              <a:rPr lang="en-US" dirty="0" smtClean="0"/>
+              <a:t>Einführung</a:t>
+            </a:r>
+            <a:r>
+              <a:rPr lang="en-US" dirty="0" smtClean="0"/>
+              <a:t> in </a:t>
+            </a:r>
+            <a:r>
+              <a:rPr lang="en-US" dirty="0" err="1" smtClean="0"/>
+              <a:t>Tensorflow</a:t>
+            </a:r>
+            <a:r>
+              <a:rPr lang="en-US" dirty="0" smtClean="0"/>
+              <a:t> (</a:t>
+            </a:r>
+            <a:r>
+              <a:rPr lang="en-US" dirty="0" err="1" smtClean="0"/>
+              <a:t>Sören</a:t>
+            </a:r>
+            <a:r>
+              <a:rPr lang="en-US" dirty="0" smtClean="0"/>
+              <a:t>)</a:t>
+            </a:r>
+          </a:p>
+          <a:p>
+            <a:r>
+              <a:rPr lang="en-US" sz="2000" dirty="0" smtClean="0"/>
+              <a:t>10min Pause</a:t>
+            </a:r>
+          </a:p>
+          <a:p>
+            <a:r>
+              <a:rPr lang="en-US" dirty="0" err="1"/>
+              <a:t>Probabilistische</a:t>
+            </a:r>
+            <a:r>
+              <a:rPr lang="en-US" dirty="0"/>
               <a:t> </a:t>
             </a:r>
             <a:r>
+              <a:rPr lang="en-US" dirty="0" err="1"/>
+              <a:t>Zeitreihenprognose</a:t>
+            </a:r>
+            <a:r>
+              <a:rPr lang="en-US" dirty="0"/>
+              <a:t> </a:t>
+            </a:r>
+            <a:r>
+              <a:rPr lang="en-US" dirty="0" err="1"/>
+              <a:t>mit</a:t>
+            </a:r>
+            <a:r>
+              <a:rPr lang="en-US" dirty="0"/>
+              <a:t> </a:t>
+            </a:r>
+            <a:r>
               <a:rPr lang="en-US" dirty="0" err="1" smtClean="0"/>
-              <a:t>Termin</a:t>
-            </a:r>
-            <a:endParaRPr lang="en-US" dirty="0"/>
-          </a:p>
-        </p:txBody>
-      </p:sp>
-      <p:sp>
-        <p:nvSpPr>
-          <p:cNvPr id="3" name="Content Placeholder 2"/>
-          <p:cNvSpPr>
-            <a:spLocks noGrp="1"/>
-          </p:cNvSpPr>
-          <p:nvPr>
-            <p:ph idx="1"/>
-          </p:nvPr>
-        </p:nvSpPr>
-        <p:spPr/>
-        <p:txBody>
-          <a:bodyPr/>
-          <a:lstStyle/>
-          <a:p>
-            <a:r>
-              <a:rPr lang="en-US" dirty="0" smtClean="0"/>
-              <a:t>5.12. </a:t>
+              <a:t>KNN</a:t>
+            </a:r>
+            <a:r>
+              <a:rPr lang="en-US" dirty="0" smtClean="0"/>
+              <a:t> (Andre)</a:t>
+            </a:r>
+          </a:p>
+          <a:p>
+            <a:r>
+              <a:rPr lang="en-US" sz="2000" dirty="0" smtClean="0"/>
+              <a:t>30min Pizza-Pause</a:t>
+            </a:r>
+          </a:p>
+          <a:p>
+            <a:r>
+              <a:rPr lang="en-US" dirty="0"/>
+              <a:t>Der </a:t>
+            </a:r>
+            <a:r>
+              <a:rPr lang="en-US" dirty="0" err="1"/>
+              <a:t>Einsatz</a:t>
+            </a:r>
+            <a:r>
+              <a:rPr lang="en-US" dirty="0"/>
+              <a:t> von R </a:t>
+            </a:r>
+            <a:r>
+              <a:rPr lang="en-US" dirty="0" err="1"/>
+              <a:t>bei</a:t>
+            </a:r>
+            <a:r>
+              <a:rPr lang="en-US" dirty="0"/>
+              <a:t> Predictive Maintenance: </a:t>
+            </a:r>
+            <a:r>
+              <a:rPr lang="en-US" dirty="0" err="1"/>
+              <a:t>ein</a:t>
+            </a:r>
+            <a:r>
+              <a:rPr lang="en-US" dirty="0"/>
+              <a:t> </a:t>
+            </a:r>
+            <a:r>
+              <a:rPr lang="en-US" dirty="0" err="1"/>
+              <a:t>Anwendungsbeispiel</a:t>
+            </a:r>
+            <a:r>
+              <a:rPr lang="en-US" dirty="0"/>
+              <a:t> der </a:t>
+            </a:r>
+            <a:r>
+              <a:rPr lang="en-US" dirty="0" err="1"/>
+              <a:t>TRUMPF</a:t>
+            </a:r>
+            <a:r>
+              <a:rPr lang="en-US" dirty="0"/>
+              <a:t> Laser GmbH (</a:t>
+            </a:r>
+            <a:r>
+              <a:rPr lang="en-US" dirty="0" smtClean="0"/>
+              <a:t>Andreas)</a:t>
+            </a:r>
+          </a:p>
+        </p:txBody>
+      </p:sp>
+      <p:sp>
+        <p:nvSpPr>
+          <p:cNvPr id="4" name="TextBox 3"/>
+          <p:cNvSpPr txBox="1"/>
+          <p:nvPr/>
+        </p:nvSpPr>
+        <p:spPr>
+          <a:xfrm>
+            <a:off x="2564969" y="6311900"/>
+            <a:ext cx="6926833" cy="369332"/>
+          </a:xfrm>
+          <a:prstGeom prst="rect">
+            <a:avLst/>
+          </a:prstGeom>
+          <a:noFill/>
+        </p:spPr>
+        <p:txBody>
+          <a:bodyPr wrap="none" rtlCol="0">
+            <a:spAutoFit/>
+          </a:bodyPr>
+          <a:lstStyle/>
+          <a:p>
+            <a:r>
+              <a:rPr lang="en-US" dirty="0" smtClean="0"/>
+              <a:t>Slides </a:t>
             </a:r>
             <a:r>
               <a:rPr lang="en-US" dirty="0" err="1" smtClean="0"/>
-              <a:t>im</a:t>
-            </a:r>
-            <a:r>
-              <a:rPr lang="en-US" dirty="0" smtClean="0"/>
-              <a:t> Science Park</a:t>
+              <a:t>unter</a:t>
+            </a:r>
+            <a:r>
+              <a:rPr lang="en-US" dirty="0" smtClean="0"/>
+              <a:t> </a:t>
+            </a:r>
+            <a:r>
+              <a:rPr lang="en-US" dirty="0" smtClean="0">
+                <a:hlinkClick r:id="rId2"/>
+              </a:rPr>
+              <a:t>https://github.com/fino-digital/kassel-data-science-meetup</a:t>
+            </a:r>
+            <a:r>
+              <a:rPr lang="en-US" dirty="0" smtClean="0"/>
+              <a:t> </a:t>
             </a:r>
             <a:endParaRPr lang="en-US" dirty="0"/>
           </a:p>
@@ -3426,7 +3582,7 @@
     </p:spTree>
     <p:extLst>
       <p:ext uri="{BB962C8B-B14F-4D97-AF65-F5344CB8AC3E}">
-        <p14:creationId xmlns:p14="http://schemas.microsoft.com/office/powerpoint/2010/main" val="445461606"/>
+        <p14:creationId xmlns:p14="http://schemas.microsoft.com/office/powerpoint/2010/main" val="42517618"/>
       </p:ext>
     </p:extLst>
   </p:cSld>
@@ -3469,8 +3625,16 @@
           <a:lstStyle/>
           <a:p>
             <a:r>
-              <a:rPr lang="en-US" dirty="0" smtClean="0"/>
-              <a:t>Agenda</a:t>
+              <a:rPr lang="en-US" dirty="0" err="1" smtClean="0"/>
+              <a:t>Nächster</a:t>
+            </a:r>
+            <a:r>
+              <a:rPr lang="en-US" dirty="0" smtClean="0"/>
+              <a:t> </a:t>
+            </a:r>
+            <a:r>
+              <a:rPr lang="en-US" dirty="0" err="1" smtClean="0"/>
+              <a:t>Termin</a:t>
             </a:r>
             <a:endParaRPr lang="en-US" dirty="0"/>
           </a:p>
@@ -3493,196 +3657,225 @@
           <a:p>
             <a:r>
               <a:rPr lang="en-US" dirty="0" smtClean="0"/>
-              <a:t>Intro (Alex)</a:t>
-            </a:r>
-          </a:p>
-          <a:p>
+              <a:t>5.12. </a:t>
+            </a:r>
             <a:r>
               <a:rPr lang="en-US" dirty="0" err="1" smtClean="0"/>
-              <a:t>Einführung</a:t>
-            </a:r>
-            <a:r>
-              <a:rPr lang="en-US" dirty="0" smtClean="0"/>
-              <a:t> in </a:t>
-            </a:r>
+              <a:t>im</a:t>
+            </a:r>
+            <a:r>
+              <a:rPr lang="en-US" dirty="0" smtClean="0"/>
+              <a:t> Science Park</a:t>
+            </a:r>
+            <a:endParaRPr lang="en-US" dirty="0"/>
+          </a:p>
+        </p:txBody>
+      </p:sp>
+    </p:spTree>
+    <p:extLst>
+      <p:ext uri="{BB962C8B-B14F-4D97-AF65-F5344CB8AC3E}">
+        <p14:creationId xmlns:p14="http://schemas.microsoft.com/office/powerpoint/2010/main" val="445461606"/>
+      </p:ext>
+    </p:extLst>
+  </p:cSld>
+  <p:clrMapOvr>
+    <a:masterClrMapping/>
+  </p:clrMapOvr>
+</p:sld>
+</file>
+
+<file path=ppt/slides/slide5.xml><?xml version="1.0" encoding="utf-8"?>
+<p:sld xmlns:a="http://schemas.openxmlformats.org/drawingml/2006/main" xmlns:r="http://schemas.openxmlformats.org/officeDocument/2006/relationships" xmlns:p="http://schemas.openxmlformats.org/presentationml/2006/main">
+  <p:cSld>
+    <p:spTree>
+      <p:nvGrpSpPr>
+        <p:cNvPr id="1" name=""/>
+        <p:cNvGrpSpPr/>
+        <p:nvPr/>
+      </p:nvGrpSpPr>
+      <p:grpSpPr>
+        <a:xfrm>
+          <a:off x="0" y="0"/>
+          <a:ext cx="0" cy="0"/>
+          <a:chOff x="0" y="0"/>
+          <a:chExt cx="0" cy="0"/>
+        </a:xfrm>
+      </p:grpSpPr>
+      <p:sp>
+        <p:nvSpPr>
+          <p:cNvPr id="2" name="Title 1"/>
+          <p:cNvSpPr>
+            <a:spLocks noGrp="1"/>
+          </p:cNvSpPr>
+          <p:nvPr>
+            <p:ph type="title"/>
+          </p:nvPr>
+        </p:nvSpPr>
+        <p:spPr/>
+        <p:txBody>
+          <a:bodyPr/>
+          <a:lstStyle/>
+          <a:p>
+            <a:r>
+              <a:rPr lang="en-US" dirty="0" smtClean="0"/>
+              <a:t>WLAN</a:t>
+            </a:r>
+            <a:endParaRPr lang="en-US" dirty="0"/>
+          </a:p>
+        </p:txBody>
+      </p:sp>
+      <p:sp>
+        <p:nvSpPr>
+          <p:cNvPr id="3" name="Content Placeholder 2"/>
+          <p:cNvSpPr>
+            <a:spLocks noGrp="1"/>
+          </p:cNvSpPr>
+          <p:nvPr>
+            <p:ph idx="1"/>
+          </p:nvPr>
+        </p:nvSpPr>
+        <p:spPr/>
+        <p:txBody>
+          <a:bodyPr/>
+          <a:lstStyle/>
+          <a:p>
             <a:r>
               <a:rPr lang="en-US" dirty="0" err="1" smtClean="0"/>
-              <a:t>Tensorflow</a:t>
-            </a:r>
-            <a:r>
-              <a:rPr lang="en-US" dirty="0" smtClean="0"/>
-              <a:t> (</a:t>
+              <a:t>SSID</a:t>
+            </a:r>
+            <a:r>
+              <a:rPr lang="en-US" dirty="0" smtClean="0"/>
+              <a:t>: Data-Meetup</a:t>
+            </a:r>
+          </a:p>
+          <a:p>
+            <a:r>
+              <a:rPr lang="en-US" dirty="0" smtClean="0"/>
+              <a:t>PW: </a:t>
             </a:r>
             <a:r>
               <a:rPr lang="en-US" dirty="0" err="1" smtClean="0"/>
-              <a:t>Sören</a:t>
-            </a:r>
-            <a:r>
-              <a:rPr lang="en-US" dirty="0" smtClean="0"/>
-              <a:t>)</a:t>
-            </a:r>
-          </a:p>
-          <a:p>
-            <a:r>
-              <a:rPr lang="en-US" sz="2000" dirty="0" smtClean="0"/>
-              <a:t>10min Pause</a:t>
-            </a:r>
-            <a:endParaRPr lang="en-US" sz="2000" dirty="0" smtClean="0"/>
-          </a:p>
-          <a:p>
-            <a:r>
-              <a:rPr lang="en-US" dirty="0" err="1"/>
-              <a:t>Probabilistische</a:t>
-            </a:r>
-            <a:r>
-              <a:rPr lang="en-US" dirty="0"/>
-              <a:t> </a:t>
-            </a:r>
-            <a:r>
-              <a:rPr lang="en-US" dirty="0" err="1"/>
-              <a:t>Zeitreihenprognose</a:t>
-            </a:r>
-            <a:r>
-              <a:rPr lang="en-US" dirty="0"/>
-              <a:t> </a:t>
-            </a:r>
-            <a:r>
-              <a:rPr lang="en-US" dirty="0" err="1"/>
-              <a:t>mit</a:t>
-            </a:r>
-            <a:r>
-              <a:rPr lang="en-US" dirty="0"/>
-              <a:t> </a:t>
-            </a:r>
+              <a:t>datameetup</a:t>
+            </a:r>
+            <a:r>
+              <a:rPr lang="en-US" dirty="0" smtClean="0"/>
+              <a:t>!</a:t>
+            </a:r>
+            <a:endParaRPr lang="en-US" dirty="0"/>
+          </a:p>
+        </p:txBody>
+      </p:sp>
+    </p:spTree>
+    <p:extLst>
+      <p:ext uri="{BB962C8B-B14F-4D97-AF65-F5344CB8AC3E}">
+        <p14:creationId xmlns:p14="http://schemas.microsoft.com/office/powerpoint/2010/main" val="1114567500"/>
+      </p:ext>
+    </p:extLst>
+  </p:cSld>
+  <p:clrMapOvr>
+    <a:masterClrMapping/>
+  </p:clrMapOvr>
+</p:sld>
+</file>
+
+<file path=ppt/slides/slide6.xml><?xml version="1.0" encoding="utf-8"?>
+<p:sld xmlns:a="http://schemas.openxmlformats.org/drawingml/2006/main" xmlns:r="http://schemas.openxmlformats.org/officeDocument/2006/relationships" xmlns:p="http://schemas.openxmlformats.org/presentationml/2006/main">
+  <p:cSld>
+    <p:spTree>
+      <p:nvGrpSpPr>
+        <p:cNvPr id="1" name=""/>
+        <p:cNvGrpSpPr/>
+        <p:nvPr/>
+      </p:nvGrpSpPr>
+      <p:grpSpPr>
+        <a:xfrm>
+          <a:off x="0" y="0"/>
+          <a:ext cx="0" cy="0"/>
+          <a:chOff x="0" y="0"/>
+          <a:chExt cx="0" cy="0"/>
+        </a:xfrm>
+      </p:grpSpPr>
+      <p:sp>
+        <p:nvSpPr>
+          <p:cNvPr id="2" name="Title 1"/>
+          <p:cNvSpPr>
+            <a:spLocks noGrp="1"/>
+          </p:cNvSpPr>
+          <p:nvPr>
+            <p:ph type="title"/>
+          </p:nvPr>
+        </p:nvSpPr>
+        <p:spPr/>
+        <p:txBody>
+          <a:bodyPr/>
+          <a:lstStyle/>
+          <a:p>
+            <a:r>
+              <a:rPr lang="en-US" dirty="0" smtClean="0"/>
+              <a:t>Feedback</a:t>
+            </a:r>
+            <a:endParaRPr lang="en-US" dirty="0"/>
+          </a:p>
+        </p:txBody>
+      </p:sp>
+      <p:sp>
+        <p:nvSpPr>
+          <p:cNvPr id="3" name="Content Placeholder 2"/>
+          <p:cNvSpPr>
+            <a:spLocks noGrp="1"/>
+          </p:cNvSpPr>
+          <p:nvPr>
+            <p:ph idx="1"/>
+          </p:nvPr>
+        </p:nvSpPr>
+        <p:spPr/>
+        <p:txBody>
+          <a:bodyPr/>
+          <a:lstStyle/>
+          <a:p>
             <a:r>
               <a:rPr lang="en-US" dirty="0" err="1" smtClean="0"/>
-              <a:t>KNN</a:t>
-            </a:r>
-            <a:r>
-              <a:rPr lang="en-US" dirty="0" smtClean="0"/>
-              <a:t> (Andre</a:t>
-            </a:r>
-            <a:r>
-              <a:rPr lang="en-US" dirty="0" smtClean="0"/>
-              <a:t>)</a:t>
-            </a:r>
-          </a:p>
-          <a:p>
-            <a:r>
-              <a:rPr lang="en-US" sz="2000" dirty="0" smtClean="0"/>
-              <a:t>30min Pizza-Pause</a:t>
-            </a:r>
-            <a:endParaRPr lang="en-US" sz="2000" dirty="0" smtClean="0"/>
-          </a:p>
-          <a:p>
-            <a:r>
-              <a:rPr lang="en-US" dirty="0"/>
-              <a:t>Der </a:t>
-            </a:r>
-            <a:r>
-              <a:rPr lang="en-US" dirty="0" err="1"/>
-              <a:t>Einsatz</a:t>
-            </a:r>
-            <a:r>
-              <a:rPr lang="en-US" dirty="0"/>
-              <a:t> von R </a:t>
-            </a:r>
-            <a:r>
-              <a:rPr lang="en-US" dirty="0" err="1"/>
-              <a:t>bei</a:t>
-            </a:r>
-            <a:r>
-              <a:rPr lang="en-US" dirty="0"/>
-              <a:t> Predictive Maintenance: </a:t>
-            </a:r>
-            <a:r>
-              <a:rPr lang="en-US" dirty="0" err="1"/>
-              <a:t>ein</a:t>
-            </a:r>
-            <a:r>
-              <a:rPr lang="en-US" dirty="0"/>
-              <a:t> </a:t>
-            </a:r>
-            <a:r>
-              <a:rPr lang="en-US" dirty="0" err="1"/>
-              <a:t>Anwendungsbeispiel</a:t>
-            </a:r>
-            <a:r>
-              <a:rPr lang="en-US" dirty="0"/>
-              <a:t> der </a:t>
-            </a:r>
-            <a:r>
-              <a:rPr lang="en-US" dirty="0" err="1"/>
-              <a:t>TRUMPF</a:t>
-            </a:r>
-            <a:r>
-              <a:rPr lang="en-US" dirty="0"/>
-              <a:t> Laser GmbH (</a:t>
-            </a:r>
-            <a:r>
-              <a:rPr lang="en-US" dirty="0" smtClean="0"/>
-              <a:t>Andreas</a:t>
-            </a:r>
-            <a:r>
-              <a:rPr lang="en-US" dirty="0" smtClean="0"/>
-              <a:t>)</a:t>
+              <a:t>Kommentare</a:t>
+            </a:r>
+            <a:r>
+              <a:rPr lang="en-US" dirty="0" smtClean="0"/>
+              <a:t> auf </a:t>
+            </a:r>
+            <a:r>
+              <a:rPr lang="en-US" dirty="0" err="1" smtClean="0"/>
+              <a:t>meetup.com</a:t>
             </a:r>
             <a:endParaRPr lang="en-US" dirty="0" smtClean="0"/>
           </a:p>
-        </p:txBody>
-      </p:sp>
-      <p:sp>
-        <p:nvSpPr>
-          <p:cNvPr id="4" name="TextBox 3"/>
-          <p:cNvSpPr txBox="1"/>
-          <p:nvPr/>
-        </p:nvSpPr>
-        <p:spPr>
-          <a:xfrm>
-            <a:off x="2564969" y="6311900"/>
-            <a:ext cx="6926833" cy="369332"/>
-          </a:xfrm>
-          <a:prstGeom prst="rect">
-            <a:avLst/>
-          </a:prstGeom>
-          <a:noFill/>
-        </p:spPr>
-        <p:txBody>
-          <a:bodyPr wrap="none" rtlCol="0">
-            <a:spAutoFit/>
-          </a:bodyPr>
-          <a:lstStyle/>
-          <a:p>
-            <a:r>
-              <a:rPr lang="en-US" dirty="0" smtClean="0"/>
-              <a:t>Slides </a:t>
-            </a:r>
-            <a:r>
-              <a:rPr lang="en-US" dirty="0" err="1" smtClean="0"/>
-              <a:t>unter</a:t>
-            </a:r>
-            <a:r>
-              <a:rPr lang="en-US" dirty="0" smtClean="0"/>
-              <a:t> </a:t>
+          <a:p>
+            <a:r>
+              <a:rPr lang="en-US" dirty="0" smtClean="0"/>
+              <a:t>E-Mail an </a:t>
             </a:r>
             <a:r>
               <a:rPr lang="en-US" dirty="0" smtClean="0">
                 <a:hlinkClick r:id="rId2"/>
               </a:rPr>
-              <a:t>https://github.com/fino-digital/kassel-data-science-meetup</a:t>
+              <a:t>ak@fino.digital</a:t>
             </a:r>
             <a:r>
               <a:rPr lang="en-US" dirty="0" smtClean="0"/>
               <a:t> </a:t>
             </a:r>
-            <a:endParaRPr lang="en-US" dirty="0"/>
+          </a:p>
+          <a:p>
+            <a:r>
+              <a:rPr lang="mr-IN" smtClean="0"/>
+              <a:t>…</a:t>
+            </a:r>
+            <a:endParaRPr lang="en-US"/>
           </a:p>
         </p:txBody>
       </p:sp>
     </p:spTree>
     <p:extLst>
       <p:ext uri="{BB962C8B-B14F-4D97-AF65-F5344CB8AC3E}">
-        <p14:creationId xmlns:p14="http://schemas.microsoft.com/office/powerpoint/2010/main" val="42517618"/>
+        <p14:creationId xmlns:p14="http://schemas.microsoft.com/office/powerpoint/2010/main" val="1433171384"/>
       </p:ext>
     </p:extLst>
   </p:cSld>

</xml_diff>